<commit_message>
Got load button working
</commit_message>
<xml_diff>
--- a/rui.pptx
+++ b/rui.pptx
@@ -106,6 +106,11 @@
       </a:defRPr>
     </a:lvl9pPr>
   </p:defaultTextStyle>
+  <p:extLst>
+    <p:ext uri="{EFAFB233-063F-42B5-8137-9DF3F51BA10A}">
+      <p15:sldGuideLst xmlns:p15="http://schemas.microsoft.com/office/powerpoint/2012/main"/>
+    </p:ext>
+  </p:extLst>
 </p:presentation>
 </file>
 
@@ -256,7 +261,7 @@
           <a:p>
             <a:fld id="{1574F870-7FC3-4387-93B0-922E2171C4F3}" type="datetimeFigureOut">
               <a:rPr lang="en-US" smtClean="0"/>
-              <a:t>4/26/2024</a:t>
+              <a:t>4/27/2024</a:t>
             </a:fld>
             <a:endParaRPr lang="en-US"/>
           </a:p>
@@ -454,7 +459,7 @@
           <a:p>
             <a:fld id="{1574F870-7FC3-4387-93B0-922E2171C4F3}" type="datetimeFigureOut">
               <a:rPr lang="en-US" smtClean="0"/>
-              <a:t>4/26/2024</a:t>
+              <a:t>4/27/2024</a:t>
             </a:fld>
             <a:endParaRPr lang="en-US"/>
           </a:p>
@@ -662,7 +667,7 @@
           <a:p>
             <a:fld id="{1574F870-7FC3-4387-93B0-922E2171C4F3}" type="datetimeFigureOut">
               <a:rPr lang="en-US" smtClean="0"/>
-              <a:t>4/26/2024</a:t>
+              <a:t>4/27/2024</a:t>
             </a:fld>
             <a:endParaRPr lang="en-US"/>
           </a:p>
@@ -860,7 +865,7 @@
           <a:p>
             <a:fld id="{1574F870-7FC3-4387-93B0-922E2171C4F3}" type="datetimeFigureOut">
               <a:rPr lang="en-US" smtClean="0"/>
-              <a:t>4/26/2024</a:t>
+              <a:t>4/27/2024</a:t>
             </a:fld>
             <a:endParaRPr lang="en-US"/>
           </a:p>
@@ -1135,7 +1140,7 @@
           <a:p>
             <a:fld id="{1574F870-7FC3-4387-93B0-922E2171C4F3}" type="datetimeFigureOut">
               <a:rPr lang="en-US" smtClean="0"/>
-              <a:t>4/26/2024</a:t>
+              <a:t>4/27/2024</a:t>
             </a:fld>
             <a:endParaRPr lang="en-US"/>
           </a:p>
@@ -1400,7 +1405,7 @@
           <a:p>
             <a:fld id="{1574F870-7FC3-4387-93B0-922E2171C4F3}" type="datetimeFigureOut">
               <a:rPr lang="en-US" smtClean="0"/>
-              <a:t>4/26/2024</a:t>
+              <a:t>4/27/2024</a:t>
             </a:fld>
             <a:endParaRPr lang="en-US"/>
           </a:p>
@@ -1812,7 +1817,7 @@
           <a:p>
             <a:fld id="{1574F870-7FC3-4387-93B0-922E2171C4F3}" type="datetimeFigureOut">
               <a:rPr lang="en-US" smtClean="0"/>
-              <a:t>4/26/2024</a:t>
+              <a:t>4/27/2024</a:t>
             </a:fld>
             <a:endParaRPr lang="en-US"/>
           </a:p>
@@ -1953,7 +1958,7 @@
           <a:p>
             <a:fld id="{1574F870-7FC3-4387-93B0-922E2171C4F3}" type="datetimeFigureOut">
               <a:rPr lang="en-US" smtClean="0"/>
-              <a:t>4/26/2024</a:t>
+              <a:t>4/27/2024</a:t>
             </a:fld>
             <a:endParaRPr lang="en-US"/>
           </a:p>
@@ -2066,7 +2071,7 @@
           <a:p>
             <a:fld id="{1574F870-7FC3-4387-93B0-922E2171C4F3}" type="datetimeFigureOut">
               <a:rPr lang="en-US" smtClean="0"/>
-              <a:t>4/26/2024</a:t>
+              <a:t>4/27/2024</a:t>
             </a:fld>
             <a:endParaRPr lang="en-US"/>
           </a:p>
@@ -2377,7 +2382,7 @@
           <a:p>
             <a:fld id="{1574F870-7FC3-4387-93B0-922E2171C4F3}" type="datetimeFigureOut">
               <a:rPr lang="en-US" smtClean="0"/>
-              <a:t>4/26/2024</a:t>
+              <a:t>4/27/2024</a:t>
             </a:fld>
             <a:endParaRPr lang="en-US"/>
           </a:p>
@@ -2665,7 +2670,7 @@
           <a:p>
             <a:fld id="{1574F870-7FC3-4387-93B0-922E2171C4F3}" type="datetimeFigureOut">
               <a:rPr lang="en-US" smtClean="0"/>
-              <a:t>4/26/2024</a:t>
+              <a:t>4/27/2024</a:t>
             </a:fld>
             <a:endParaRPr lang="en-US"/>
           </a:p>
@@ -2906,7 +2911,7 @@
           <a:p>
             <a:fld id="{1574F870-7FC3-4387-93B0-922E2171C4F3}" type="datetimeFigureOut">
               <a:rPr lang="en-US" smtClean="0"/>
-              <a:t>4/26/2024</a:t>
+              <a:t>4/27/2024</a:t>
             </a:fld>
             <a:endParaRPr lang="en-US"/>
           </a:p>
@@ -3922,7 +3927,7 @@
         </p:nvSpPr>
         <p:spPr>
           <a:xfrm>
-            <a:off x="9388549" y="4721188"/>
+            <a:off x="6919132" y="4611687"/>
             <a:ext cx="2392325" cy="1662185"/>
           </a:xfrm>
           <a:prstGeom prst="rect">
@@ -3990,7 +3995,7 @@
         </p:nvGrpSpPr>
         <p:grpSpPr>
           <a:xfrm>
-            <a:off x="8240231" y="2193927"/>
+            <a:off x="6929764" y="2320095"/>
             <a:ext cx="2392325" cy="1662185"/>
             <a:chOff x="8240231" y="2193927"/>
             <a:chExt cx="2392325" cy="1662185"/>

</xml_diff>